<commit_message>
Updating R Markdown example
</commit_message>
<xml_diff>
--- a/further_material/created_images.pptx
+++ b/further_material/created_images.pptx
@@ -5,18 +5,19 @@
     <p:sldMasterId id="2147483648" r:id="rId1"/>
   </p:sldMasterIdLst>
   <p:sldIdLst>
-    <p:sldId id="256" r:id="rId2"/>
-    <p:sldId id="258" r:id="rId3"/>
-    <p:sldId id="259" r:id="rId4"/>
-    <p:sldId id="260" r:id="rId5"/>
-    <p:sldId id="261" r:id="rId6"/>
-    <p:sldId id="257" r:id="rId7"/>
-    <p:sldId id="262" r:id="rId8"/>
-    <p:sldId id="263" r:id="rId9"/>
-    <p:sldId id="265" r:id="rId10"/>
-    <p:sldId id="266" r:id="rId11"/>
-    <p:sldId id="264" r:id="rId12"/>
-    <p:sldId id="267" r:id="rId13"/>
+    <p:sldId id="268" r:id="rId2"/>
+    <p:sldId id="273" r:id="rId3"/>
+    <p:sldId id="269" r:id="rId4"/>
+    <p:sldId id="270" r:id="rId5"/>
+    <p:sldId id="271" r:id="rId6"/>
+    <p:sldId id="272" r:id="rId7"/>
+    <p:sldId id="257" r:id="rId8"/>
+    <p:sldId id="262" r:id="rId9"/>
+    <p:sldId id="263" r:id="rId10"/>
+    <p:sldId id="265" r:id="rId11"/>
+    <p:sldId id="266" r:id="rId12"/>
+    <p:sldId id="264" r:id="rId13"/>
+    <p:sldId id="267" r:id="rId14"/>
   </p:sldIdLst>
   <p:sldSz cx="12192000" cy="6858000"/>
   <p:notesSz cx="6858000" cy="9144000"/>
@@ -270,7 +271,7 @@
           <a:p>
             <a:fld id="{1431BC66-C75A-264A-BF3B-FAE092F2E1E7}" type="datetimeFigureOut">
               <a:rPr lang="de-DE" smtClean="0"/>
-              <a:t>09.01.21</a:t>
+              <a:t>11.01.21</a:t>
             </a:fld>
             <a:endParaRPr lang="de-DE"/>
           </a:p>
@@ -468,7 +469,7 @@
           <a:p>
             <a:fld id="{1431BC66-C75A-264A-BF3B-FAE092F2E1E7}" type="datetimeFigureOut">
               <a:rPr lang="de-DE" smtClean="0"/>
-              <a:t>09.01.21</a:t>
+              <a:t>11.01.21</a:t>
             </a:fld>
             <a:endParaRPr lang="de-DE"/>
           </a:p>
@@ -676,7 +677,7 @@
           <a:p>
             <a:fld id="{1431BC66-C75A-264A-BF3B-FAE092F2E1E7}" type="datetimeFigureOut">
               <a:rPr lang="de-DE" smtClean="0"/>
-              <a:t>09.01.21</a:t>
+              <a:t>11.01.21</a:t>
             </a:fld>
             <a:endParaRPr lang="de-DE"/>
           </a:p>
@@ -874,7 +875,7 @@
           <a:p>
             <a:fld id="{1431BC66-C75A-264A-BF3B-FAE092F2E1E7}" type="datetimeFigureOut">
               <a:rPr lang="de-DE" smtClean="0"/>
-              <a:t>09.01.21</a:t>
+              <a:t>11.01.21</a:t>
             </a:fld>
             <a:endParaRPr lang="de-DE"/>
           </a:p>
@@ -1149,7 +1150,7 @@
           <a:p>
             <a:fld id="{1431BC66-C75A-264A-BF3B-FAE092F2E1E7}" type="datetimeFigureOut">
               <a:rPr lang="de-DE" smtClean="0"/>
-              <a:t>09.01.21</a:t>
+              <a:t>11.01.21</a:t>
             </a:fld>
             <a:endParaRPr lang="de-DE"/>
           </a:p>
@@ -1414,7 +1415,7 @@
           <a:p>
             <a:fld id="{1431BC66-C75A-264A-BF3B-FAE092F2E1E7}" type="datetimeFigureOut">
               <a:rPr lang="de-DE" smtClean="0"/>
-              <a:t>09.01.21</a:t>
+              <a:t>11.01.21</a:t>
             </a:fld>
             <a:endParaRPr lang="de-DE"/>
           </a:p>
@@ -1826,7 +1827,7 @@
           <a:p>
             <a:fld id="{1431BC66-C75A-264A-BF3B-FAE092F2E1E7}" type="datetimeFigureOut">
               <a:rPr lang="de-DE" smtClean="0"/>
-              <a:t>09.01.21</a:t>
+              <a:t>11.01.21</a:t>
             </a:fld>
             <a:endParaRPr lang="de-DE"/>
           </a:p>
@@ -1967,7 +1968,7 @@
           <a:p>
             <a:fld id="{1431BC66-C75A-264A-BF3B-FAE092F2E1E7}" type="datetimeFigureOut">
               <a:rPr lang="de-DE" smtClean="0"/>
-              <a:t>09.01.21</a:t>
+              <a:t>11.01.21</a:t>
             </a:fld>
             <a:endParaRPr lang="de-DE"/>
           </a:p>
@@ -2080,7 +2081,7 @@
           <a:p>
             <a:fld id="{1431BC66-C75A-264A-BF3B-FAE092F2E1E7}" type="datetimeFigureOut">
               <a:rPr lang="de-DE" smtClean="0"/>
-              <a:t>09.01.21</a:t>
+              <a:t>11.01.21</a:t>
             </a:fld>
             <a:endParaRPr lang="de-DE"/>
           </a:p>
@@ -2391,7 +2392,7 @@
           <a:p>
             <a:fld id="{1431BC66-C75A-264A-BF3B-FAE092F2E1E7}" type="datetimeFigureOut">
               <a:rPr lang="de-DE" smtClean="0"/>
-              <a:t>09.01.21</a:t>
+              <a:t>11.01.21</a:t>
             </a:fld>
             <a:endParaRPr lang="de-DE"/>
           </a:p>
@@ -2679,7 +2680,7 @@
           <a:p>
             <a:fld id="{1431BC66-C75A-264A-BF3B-FAE092F2E1E7}" type="datetimeFigureOut">
               <a:rPr lang="de-DE" smtClean="0"/>
-              <a:t>09.01.21</a:t>
+              <a:t>11.01.21</a:t>
             </a:fld>
             <a:endParaRPr lang="de-DE"/>
           </a:p>
@@ -2920,7 +2921,7 @@
           <a:p>
             <a:fld id="{1431BC66-C75A-264A-BF3B-FAE092F2E1E7}" type="datetimeFigureOut">
               <a:rPr lang="de-DE" smtClean="0"/>
-              <a:t>09.01.21</a:t>
+              <a:t>11.01.21</a:t>
             </a:fld>
             <a:endParaRPr lang="de-DE"/>
           </a:p>
@@ -3339,10 +3340,10 @@
       </p:grpSpPr>
       <p:pic>
         <p:nvPicPr>
-          <p:cNvPr id="27" name="Grafik 26">
-            <a:extLst>
-              <a:ext uri="{FF2B5EF4-FFF2-40B4-BE49-F238E27FC236}">
-                <a16:creationId xmlns:a16="http://schemas.microsoft.com/office/drawing/2014/main" id="{546EAC80-D742-594F-ADF7-E07094174DD2}"/>
+          <p:cNvPr id="4" name="Grafik 3">
+            <a:extLst>
+              <a:ext uri="{FF2B5EF4-FFF2-40B4-BE49-F238E27FC236}">
+                <a16:creationId xmlns:a16="http://schemas.microsoft.com/office/drawing/2014/main" id="{8C3F0816-F3B2-B347-87C5-6A63C4D9BBF9}"/>
               </a:ext>
             </a:extLst>
           </p:cNvPr>
@@ -3359,8 +3360,8 @@
         </p:blipFill>
         <p:spPr>
           <a:xfrm>
-            <a:off x="321304" y="0"/>
-            <a:ext cx="11320784" cy="6858000"/>
+            <a:off x="1540641" y="0"/>
+            <a:ext cx="8708252" cy="6858000"/>
           </a:xfrm>
           <a:prstGeom prst="rect">
             <a:avLst/>
@@ -3381,7 +3382,7 @@
         </p:nvGrpSpPr>
         <p:grpSpPr>
           <a:xfrm>
-            <a:off x="6472236" y="3066568"/>
+            <a:off x="6996113" y="2667975"/>
             <a:ext cx="3228975" cy="369332"/>
             <a:chOff x="3357563" y="1445180"/>
             <a:chExt cx="3228975" cy="369332"/>
@@ -3495,7 +3496,7 @@
         </p:nvGrpSpPr>
         <p:grpSpPr>
           <a:xfrm>
-            <a:off x="3281355" y="1397549"/>
+            <a:off x="4167181" y="1168944"/>
             <a:ext cx="3228975" cy="369332"/>
             <a:chOff x="3357563" y="1445180"/>
             <a:chExt cx="3228975" cy="369332"/>
@@ -3609,7 +3610,7 @@
         </p:nvGrpSpPr>
         <p:grpSpPr>
           <a:xfrm>
-            <a:off x="7181851" y="4190518"/>
+            <a:off x="7167563" y="4246971"/>
             <a:ext cx="3228975" cy="485777"/>
             <a:chOff x="3357563" y="1328735"/>
             <a:chExt cx="3228975" cy="485777"/>
@@ -3723,7 +3724,7 @@
         </p:nvGrpSpPr>
         <p:grpSpPr>
           <a:xfrm>
-            <a:off x="3709980" y="4564915"/>
+            <a:off x="4667250" y="4822096"/>
             <a:ext cx="3228975" cy="369332"/>
             <a:chOff x="3357563" y="1430892"/>
             <a:chExt cx="3228975" cy="369332"/>
@@ -3837,7 +3838,7 @@
         </p:nvSpPr>
         <p:spPr>
           <a:xfrm>
-            <a:off x="10671263" y="4541399"/>
+            <a:off x="9481354" y="4625672"/>
             <a:ext cx="767539" cy="392848"/>
           </a:xfrm>
           <a:prstGeom prst="roundRect">
@@ -3885,7 +3886,7 @@
         </p:nvSpPr>
         <p:spPr>
           <a:xfrm>
-            <a:off x="2208301" y="221119"/>
+            <a:off x="3251292" y="192543"/>
             <a:ext cx="767539" cy="392848"/>
           </a:xfrm>
           <a:prstGeom prst="roundRect">
@@ -3933,7 +3934,7 @@
         </p:nvGrpSpPr>
         <p:grpSpPr>
           <a:xfrm>
-            <a:off x="2838452" y="376236"/>
+            <a:off x="3881443" y="376236"/>
             <a:ext cx="3900486" cy="528642"/>
             <a:chOff x="3443290" y="1371598"/>
             <a:chExt cx="3900486" cy="528642"/>
@@ -4033,10 +4034,58 @@
           </p:txBody>
         </p:sp>
       </p:grpSp>
+      <p:sp>
+        <p:nvSpPr>
+          <p:cNvPr id="24" name="Abgerundetes Rechteck 23">
+            <a:extLst>
+              <a:ext uri="{FF2B5EF4-FFF2-40B4-BE49-F238E27FC236}">
+                <a16:creationId xmlns:a16="http://schemas.microsoft.com/office/drawing/2014/main" id="{1C31B62B-25A4-8E42-91D1-490DCCF45FEE}"/>
+              </a:ext>
+            </a:extLst>
+          </p:cNvPr>
+          <p:cNvSpPr/>
+          <p:nvPr/>
+        </p:nvSpPr>
+        <p:spPr>
+          <a:xfrm>
+            <a:off x="8735800" y="192543"/>
+            <a:ext cx="767539" cy="392848"/>
+          </a:xfrm>
+          <a:prstGeom prst="roundRect">
+            <a:avLst/>
+          </a:prstGeom>
+          <a:noFill/>
+          <a:ln w="28575"/>
+        </p:spPr>
+        <p:style>
+          <a:lnRef idx="2">
+            <a:schemeClr val="accent1">
+              <a:shade val="50000"/>
+            </a:schemeClr>
+          </a:lnRef>
+          <a:fillRef idx="1">
+            <a:schemeClr val="accent1"/>
+          </a:fillRef>
+          <a:effectRef idx="0">
+            <a:schemeClr val="accent1"/>
+          </a:effectRef>
+          <a:fontRef idx="minor">
+            <a:schemeClr val="lt1"/>
+          </a:fontRef>
+        </p:style>
+        <p:txBody>
+          <a:bodyPr rtlCol="0" anchor="ctr"/>
+          <a:lstStyle/>
+          <a:p>
+            <a:pPr algn="ctr"/>
+            <a:endParaRPr lang="de-DE"/>
+          </a:p>
+        </p:txBody>
+      </p:sp>
     </p:spTree>
     <p:extLst>
       <p:ext uri="{BB962C8B-B14F-4D97-AF65-F5344CB8AC3E}">
-        <p14:creationId xmlns:p14="http://schemas.microsoft.com/office/powerpoint/2010/main" val="1199239431"/>
+        <p14:creationId xmlns:p14="http://schemas.microsoft.com/office/powerpoint/2010/main" val="392456282"/>
       </p:ext>
     </p:extLst>
   </p:cSld>
@@ -4093,42 +4142,12 @@
           </a:prstGeom>
         </p:spPr>
       </p:pic>
-      <p:pic>
-        <p:nvPicPr>
-          <p:cNvPr id="6" name="Grafik 5">
-            <a:extLst>
-              <a:ext uri="{FF2B5EF4-FFF2-40B4-BE49-F238E27FC236}">
-                <a16:creationId xmlns:a16="http://schemas.microsoft.com/office/drawing/2014/main" id="{A2939881-C9E8-074B-A4F5-9EB6C28719EB}"/>
-              </a:ext>
-            </a:extLst>
-          </p:cNvPr>
-          <p:cNvPicPr>
-            <a:picLocks noChangeAspect="1"/>
-          </p:cNvPicPr>
-          <p:nvPr/>
-        </p:nvPicPr>
-        <p:blipFill>
-          <a:blip r:embed="rId3"/>
-          <a:stretch>
-            <a:fillRect/>
-          </a:stretch>
-        </p:blipFill>
-        <p:spPr>
-          <a:xfrm>
-            <a:off x="7867237" y="295033"/>
-            <a:ext cx="4107315" cy="2362441"/>
-          </a:xfrm>
-          <a:prstGeom prst="rect">
-            <a:avLst/>
-          </a:prstGeom>
-        </p:spPr>
-      </p:pic>
-      <p:sp>
-        <p:nvSpPr>
-          <p:cNvPr id="4" name="Abgerundetes Rechteck 3">
-            <a:extLst>
-              <a:ext uri="{FF2B5EF4-FFF2-40B4-BE49-F238E27FC236}">
-                <a16:creationId xmlns:a16="http://schemas.microsoft.com/office/drawing/2014/main" id="{8793852D-BF36-0948-848D-B36964E18CB4}"/>
+      <p:sp>
+        <p:nvSpPr>
+          <p:cNvPr id="3" name="Abgerundetes Rechteck 2">
+            <a:extLst>
+              <a:ext uri="{FF2B5EF4-FFF2-40B4-BE49-F238E27FC236}">
+                <a16:creationId xmlns:a16="http://schemas.microsoft.com/office/drawing/2014/main" id="{7047D953-CDB4-C347-AA79-FDE6382F9862}"/>
               </a:ext>
             </a:extLst>
           </p:cNvPr>
@@ -4137,8 +4156,8 @@
         </p:nvSpPr>
         <p:spPr>
           <a:xfrm>
-            <a:off x="8486775" y="523876"/>
-            <a:ext cx="781451" cy="247650"/>
+            <a:off x="10672353" y="0"/>
+            <a:ext cx="1281924" cy="271463"/>
           </a:xfrm>
           <a:prstGeom prst="roundRect">
             <a:avLst/>
@@ -4177,6 +4196,258 @@
           </a:p>
         </p:txBody>
       </p:sp>
+      <p:sp>
+        <p:nvSpPr>
+          <p:cNvPr id="4" name="Abgerundetes Rechteck 3">
+            <a:extLst>
+              <a:ext uri="{FF2B5EF4-FFF2-40B4-BE49-F238E27FC236}">
+                <a16:creationId xmlns:a16="http://schemas.microsoft.com/office/drawing/2014/main" id="{8793852D-BF36-0948-848D-B36964E18CB4}"/>
+              </a:ext>
+            </a:extLst>
+          </p:cNvPr>
+          <p:cNvSpPr/>
+          <p:nvPr/>
+        </p:nvSpPr>
+        <p:spPr>
+          <a:xfrm>
+            <a:off x="7867239" y="523875"/>
+            <a:ext cx="4087037" cy="271463"/>
+          </a:xfrm>
+          <a:prstGeom prst="roundRect">
+            <a:avLst/>
+          </a:prstGeom>
+          <a:noFill/>
+          <a:ln w="38100">
+            <a:solidFill>
+              <a:schemeClr val="accent2">
+                <a:lumMod val="50000"/>
+              </a:schemeClr>
+            </a:solidFill>
+          </a:ln>
+        </p:spPr>
+        <p:style>
+          <a:lnRef idx="2">
+            <a:schemeClr val="accent1">
+              <a:shade val="50000"/>
+            </a:schemeClr>
+          </a:lnRef>
+          <a:fillRef idx="1">
+            <a:schemeClr val="accent1"/>
+          </a:fillRef>
+          <a:effectRef idx="0">
+            <a:schemeClr val="accent1"/>
+          </a:effectRef>
+          <a:fontRef idx="minor">
+            <a:schemeClr val="lt1"/>
+          </a:fontRef>
+        </p:style>
+        <p:txBody>
+          <a:bodyPr rtlCol="0" anchor="ctr"/>
+          <a:lstStyle/>
+          <a:p>
+            <a:pPr algn="ctr"/>
+            <a:endParaRPr lang="de-DE"/>
+          </a:p>
+        </p:txBody>
+      </p:sp>
+      <p:sp>
+        <p:nvSpPr>
+          <p:cNvPr id="5" name="Abgerundetes Rechteck 4">
+            <a:extLst>
+              <a:ext uri="{FF2B5EF4-FFF2-40B4-BE49-F238E27FC236}">
+                <a16:creationId xmlns:a16="http://schemas.microsoft.com/office/drawing/2014/main" id="{67BD2F50-D3DF-D447-A339-D5FA73D67B2C}"/>
+              </a:ext>
+            </a:extLst>
+          </p:cNvPr>
+          <p:cNvSpPr/>
+          <p:nvPr/>
+        </p:nvSpPr>
+        <p:spPr>
+          <a:xfrm>
+            <a:off x="3676239" y="0"/>
+            <a:ext cx="438561" cy="271463"/>
+          </a:xfrm>
+          <a:prstGeom prst="roundRect">
+            <a:avLst/>
+          </a:prstGeom>
+          <a:noFill/>
+          <a:ln w="38100">
+            <a:solidFill>
+              <a:schemeClr val="accent2">
+                <a:lumMod val="50000"/>
+              </a:schemeClr>
+            </a:solidFill>
+          </a:ln>
+        </p:spPr>
+        <p:style>
+          <a:lnRef idx="2">
+            <a:schemeClr val="accent1">
+              <a:shade val="50000"/>
+            </a:schemeClr>
+          </a:lnRef>
+          <a:fillRef idx="1">
+            <a:schemeClr val="accent1"/>
+          </a:fillRef>
+          <a:effectRef idx="0">
+            <a:schemeClr val="accent1"/>
+          </a:effectRef>
+          <a:fontRef idx="minor">
+            <a:schemeClr val="lt1"/>
+          </a:fontRef>
+        </p:style>
+        <p:txBody>
+          <a:bodyPr rtlCol="0" anchor="ctr"/>
+          <a:lstStyle/>
+          <a:p>
+            <a:pPr algn="ctr"/>
+            <a:endParaRPr lang="de-DE"/>
+          </a:p>
+        </p:txBody>
+      </p:sp>
+    </p:spTree>
+    <p:extLst>
+      <p:ext uri="{BB962C8B-B14F-4D97-AF65-F5344CB8AC3E}">
+        <p14:creationId xmlns:p14="http://schemas.microsoft.com/office/powerpoint/2010/main" val="2350966591"/>
+      </p:ext>
+    </p:extLst>
+  </p:cSld>
+  <p:clrMapOvr>
+    <a:masterClrMapping/>
+  </p:clrMapOvr>
+</p:sld>
+</file>
+
+<file path=ppt/slides/slide11.xml><?xml version="1.0" encoding="utf-8"?>
+<p:sld xmlns:a="http://schemas.openxmlformats.org/drawingml/2006/main" xmlns:r="http://schemas.openxmlformats.org/officeDocument/2006/relationships" xmlns:p="http://schemas.openxmlformats.org/presentationml/2006/main">
+  <p:cSld>
+    <p:spTree>
+      <p:nvGrpSpPr>
+        <p:cNvPr id="1" name=""/>
+        <p:cNvGrpSpPr/>
+        <p:nvPr/>
+      </p:nvGrpSpPr>
+      <p:grpSpPr>
+        <a:xfrm>
+          <a:off x="0" y="0"/>
+          <a:ext cx="0" cy="0"/>
+          <a:chOff x="0" y="0"/>
+          <a:chExt cx="0" cy="0"/>
+        </a:xfrm>
+      </p:grpSpPr>
+      <p:pic>
+        <p:nvPicPr>
+          <p:cNvPr id="2" name="Grafik 1">
+            <a:extLst>
+              <a:ext uri="{FF2B5EF4-FFF2-40B4-BE49-F238E27FC236}">
+                <a16:creationId xmlns:a16="http://schemas.microsoft.com/office/drawing/2014/main" id="{ABBB131D-E791-5B45-9628-14A2F970BCCC}"/>
+              </a:ext>
+            </a:extLst>
+          </p:cNvPr>
+          <p:cNvPicPr>
+            <a:picLocks noChangeAspect="1"/>
+          </p:cNvPicPr>
+          <p:nvPr/>
+        </p:nvPicPr>
+        <p:blipFill>
+          <a:blip r:embed="rId2"/>
+          <a:stretch>
+            <a:fillRect/>
+          </a:stretch>
+        </p:blipFill>
+        <p:spPr>
+          <a:xfrm>
+            <a:off x="237722" y="0"/>
+            <a:ext cx="11716555" cy="6858000"/>
+          </a:xfrm>
+          <a:prstGeom prst="rect">
+            <a:avLst/>
+          </a:prstGeom>
+        </p:spPr>
+      </p:pic>
+      <p:pic>
+        <p:nvPicPr>
+          <p:cNvPr id="6" name="Grafik 5">
+            <a:extLst>
+              <a:ext uri="{FF2B5EF4-FFF2-40B4-BE49-F238E27FC236}">
+                <a16:creationId xmlns:a16="http://schemas.microsoft.com/office/drawing/2014/main" id="{A2939881-C9E8-074B-A4F5-9EB6C28719EB}"/>
+              </a:ext>
+            </a:extLst>
+          </p:cNvPr>
+          <p:cNvPicPr>
+            <a:picLocks noChangeAspect="1"/>
+          </p:cNvPicPr>
+          <p:nvPr/>
+        </p:nvPicPr>
+        <p:blipFill>
+          <a:blip r:embed="rId3"/>
+          <a:stretch>
+            <a:fillRect/>
+          </a:stretch>
+        </p:blipFill>
+        <p:spPr>
+          <a:xfrm>
+            <a:off x="7867237" y="295033"/>
+            <a:ext cx="4107315" cy="2362441"/>
+          </a:xfrm>
+          <a:prstGeom prst="rect">
+            <a:avLst/>
+          </a:prstGeom>
+        </p:spPr>
+      </p:pic>
+      <p:sp>
+        <p:nvSpPr>
+          <p:cNvPr id="4" name="Abgerundetes Rechteck 3">
+            <a:extLst>
+              <a:ext uri="{FF2B5EF4-FFF2-40B4-BE49-F238E27FC236}">
+                <a16:creationId xmlns:a16="http://schemas.microsoft.com/office/drawing/2014/main" id="{8793852D-BF36-0948-848D-B36964E18CB4}"/>
+              </a:ext>
+            </a:extLst>
+          </p:cNvPr>
+          <p:cNvSpPr/>
+          <p:nvPr/>
+        </p:nvSpPr>
+        <p:spPr>
+          <a:xfrm>
+            <a:off x="8486775" y="523876"/>
+            <a:ext cx="781451" cy="247650"/>
+          </a:xfrm>
+          <a:prstGeom prst="roundRect">
+            <a:avLst/>
+          </a:prstGeom>
+          <a:noFill/>
+          <a:ln w="38100">
+            <a:solidFill>
+              <a:schemeClr val="accent2">
+                <a:lumMod val="50000"/>
+              </a:schemeClr>
+            </a:solidFill>
+          </a:ln>
+        </p:spPr>
+        <p:style>
+          <a:lnRef idx="2">
+            <a:schemeClr val="accent1">
+              <a:shade val="50000"/>
+            </a:schemeClr>
+          </a:lnRef>
+          <a:fillRef idx="1">
+            <a:schemeClr val="accent1"/>
+          </a:fillRef>
+          <a:effectRef idx="0">
+            <a:schemeClr val="accent1"/>
+          </a:effectRef>
+          <a:fontRef idx="minor">
+            <a:schemeClr val="lt1"/>
+          </a:fontRef>
+        </p:style>
+        <p:txBody>
+          <a:bodyPr rtlCol="0" anchor="ctr"/>
+          <a:lstStyle/>
+          <a:p>
+            <a:pPr algn="ctr"/>
+            <a:endParaRPr lang="de-DE"/>
+          </a:p>
+        </p:txBody>
+      </p:sp>
     </p:spTree>
     <p:extLst>
       <p:ext uri="{BB962C8B-B14F-4D97-AF65-F5344CB8AC3E}">
@@ -4190,7 +4461,7 @@
 </p:sld>
 </file>
 
-<file path=ppt/slides/slide11.xml><?xml version="1.0" encoding="utf-8"?>
+<file path=ppt/slides/slide12.xml><?xml version="1.0" encoding="utf-8"?>
 <p:sld xmlns:a="http://schemas.openxmlformats.org/drawingml/2006/main" xmlns:r="http://schemas.openxmlformats.org/officeDocument/2006/relationships" xmlns:p="http://schemas.openxmlformats.org/presentationml/2006/main">
   <p:cSld>
     <p:spTree>
@@ -4220,7 +4491,7 @@
 </p:sld>
 </file>
 
-<file path=ppt/slides/slide12.xml><?xml version="1.0" encoding="utf-8"?>
+<file path=ppt/slides/slide13.xml><?xml version="1.0" encoding="utf-8"?>
 <p:sld xmlns:a="http://schemas.openxmlformats.org/drawingml/2006/main" xmlns:r="http://schemas.openxmlformats.org/officeDocument/2006/relationships" xmlns:p="http://schemas.openxmlformats.org/presentationml/2006/main">
   <p:cSld>
     <p:spTree>
@@ -4269,10 +4540,10 @@
       </p:grpSpPr>
       <p:pic>
         <p:nvPicPr>
-          <p:cNvPr id="27" name="Grafik 26">
-            <a:extLst>
-              <a:ext uri="{FF2B5EF4-FFF2-40B4-BE49-F238E27FC236}">
-                <a16:creationId xmlns:a16="http://schemas.microsoft.com/office/drawing/2014/main" id="{546EAC80-D742-594F-ADF7-E07094174DD2}"/>
+          <p:cNvPr id="23" name="Grafik 22">
+            <a:extLst>
+              <a:ext uri="{FF2B5EF4-FFF2-40B4-BE49-F238E27FC236}">
+                <a16:creationId xmlns:a16="http://schemas.microsoft.com/office/drawing/2014/main" id="{4EE089BA-BED0-B340-B15C-6CD62814D793}"/>
               </a:ext>
             </a:extLst>
           </p:cNvPr>
@@ -4289,8 +4560,68 @@
         </p:blipFill>
         <p:spPr>
           <a:xfrm>
-            <a:off x="321304" y="0"/>
-            <a:ext cx="11320784" cy="6858000"/>
+            <a:off x="1540641" y="0"/>
+            <a:ext cx="8708252" cy="6858000"/>
+          </a:xfrm>
+          <a:prstGeom prst="rect">
+            <a:avLst/>
+          </a:prstGeom>
+        </p:spPr>
+      </p:pic>
+    </p:spTree>
+    <p:extLst>
+      <p:ext uri="{BB962C8B-B14F-4D97-AF65-F5344CB8AC3E}">
+        <p14:creationId xmlns:p14="http://schemas.microsoft.com/office/powerpoint/2010/main" val="2545844423"/>
+      </p:ext>
+    </p:extLst>
+  </p:cSld>
+  <p:clrMapOvr>
+    <a:masterClrMapping/>
+  </p:clrMapOvr>
+</p:sld>
+</file>
+
+<file path=ppt/slides/slide3.xml><?xml version="1.0" encoding="utf-8"?>
+<p:sld xmlns:a="http://schemas.openxmlformats.org/drawingml/2006/main" xmlns:r="http://schemas.openxmlformats.org/officeDocument/2006/relationships" xmlns:p="http://schemas.openxmlformats.org/presentationml/2006/main">
+  <p:cSld>
+    <p:spTree>
+      <p:nvGrpSpPr>
+        <p:cNvPr id="1" name=""/>
+        <p:cNvGrpSpPr/>
+        <p:nvPr/>
+      </p:nvGrpSpPr>
+      <p:grpSpPr>
+        <a:xfrm>
+          <a:off x="0" y="0"/>
+          <a:ext cx="0" cy="0"/>
+          <a:chOff x="0" y="0"/>
+          <a:chExt cx="0" cy="0"/>
+        </a:xfrm>
+      </p:grpSpPr>
+      <p:pic>
+        <p:nvPicPr>
+          <p:cNvPr id="4" name="Grafik 3">
+            <a:extLst>
+              <a:ext uri="{FF2B5EF4-FFF2-40B4-BE49-F238E27FC236}">
+                <a16:creationId xmlns:a16="http://schemas.microsoft.com/office/drawing/2014/main" id="{8C3F0816-F3B2-B347-87C5-6A63C4D9BBF9}"/>
+              </a:ext>
+            </a:extLst>
+          </p:cNvPr>
+          <p:cNvPicPr>
+            <a:picLocks noChangeAspect="1"/>
+          </p:cNvPicPr>
+          <p:nvPr/>
+        </p:nvPicPr>
+        <p:blipFill>
+          <a:blip r:embed="rId2"/>
+          <a:stretch>
+            <a:fillRect/>
+          </a:stretch>
+        </p:blipFill>
+        <p:spPr>
+          <a:xfrm>
+            <a:off x="1564446" y="0"/>
+            <a:ext cx="8708252" cy="6858000"/>
           </a:xfrm>
           <a:prstGeom prst="rect">
             <a:avLst/>
@@ -4299,10 +4630,10 @@
       </p:pic>
       <p:grpSp>
         <p:nvGrpSpPr>
-          <p:cNvPr id="10" name="Gruppieren 9">
-            <a:extLst>
-              <a:ext uri="{FF2B5EF4-FFF2-40B4-BE49-F238E27FC236}">
-                <a16:creationId xmlns:a16="http://schemas.microsoft.com/office/drawing/2014/main" id="{C591779A-A91E-7A41-91F5-780300AE7481}"/>
+          <p:cNvPr id="31" name="Gruppieren 30">
+            <a:extLst>
+              <a:ext uri="{FF2B5EF4-FFF2-40B4-BE49-F238E27FC236}">
+                <a16:creationId xmlns:a16="http://schemas.microsoft.com/office/drawing/2014/main" id="{3EE1BFC2-7760-2040-AC7F-43E809AC872F}"/>
               </a:ext>
             </a:extLst>
           </p:cNvPr>
@@ -4311,7 +4642,7 @@
         </p:nvGrpSpPr>
         <p:grpSpPr>
           <a:xfrm>
-            <a:off x="3281355" y="1397549"/>
+            <a:off x="4167181" y="1168944"/>
             <a:ext cx="3228975" cy="369332"/>
             <a:chOff x="3357563" y="1445180"/>
             <a:chExt cx="3228975" cy="369332"/>
@@ -4319,10 +4650,10 @@
         </p:grpSpPr>
         <p:sp>
           <p:nvSpPr>
-            <p:cNvPr id="11" name="Pfeil nach links 10">
+            <p:cNvPr id="32" name="Pfeil nach links 31">
               <a:extLst>
                 <a:ext uri="{FF2B5EF4-FFF2-40B4-BE49-F238E27FC236}">
-                  <a16:creationId xmlns:a16="http://schemas.microsoft.com/office/drawing/2014/main" id="{BE65C7B5-D73D-F149-9CA3-0B79E46AFB14}"/>
+                  <a16:creationId xmlns:a16="http://schemas.microsoft.com/office/drawing/2014/main" id="{22300B02-45FB-524E-A8F0-E92D5929EF1F}"/>
                 </a:ext>
               </a:extLst>
             </p:cNvPr>
@@ -4377,10 +4708,10 @@
         </p:sp>
         <p:sp>
           <p:nvSpPr>
-            <p:cNvPr id="12" name="Textfeld 11">
+            <p:cNvPr id="33" name="Textfeld 32">
               <a:extLst>
                 <a:ext uri="{FF2B5EF4-FFF2-40B4-BE49-F238E27FC236}">
-                  <a16:creationId xmlns:a16="http://schemas.microsoft.com/office/drawing/2014/main" id="{D67B4305-E397-AB4B-8E60-9937735071D5}"/>
+                  <a16:creationId xmlns:a16="http://schemas.microsoft.com/office/drawing/2014/main" id="{A50D7C2E-E08F-9D42-A87A-A0B25F6AF171}"/>
                 </a:ext>
               </a:extLst>
             </p:cNvPr>
@@ -4414,7 +4745,7 @@
     </p:spTree>
     <p:extLst>
       <p:ext uri="{BB962C8B-B14F-4D97-AF65-F5344CB8AC3E}">
-        <p14:creationId xmlns:p14="http://schemas.microsoft.com/office/powerpoint/2010/main" val="146010434"/>
+        <p14:creationId xmlns:p14="http://schemas.microsoft.com/office/powerpoint/2010/main" val="508189116"/>
       </p:ext>
     </p:extLst>
   </p:cSld>
@@ -4424,7 +4755,7 @@
 </p:sld>
 </file>
 
-<file path=ppt/slides/slide3.xml><?xml version="1.0" encoding="utf-8"?>
+<file path=ppt/slides/slide4.xml><?xml version="1.0" encoding="utf-8"?>
 <p:sld xmlns:a="http://schemas.openxmlformats.org/drawingml/2006/main" xmlns:r="http://schemas.openxmlformats.org/officeDocument/2006/relationships" xmlns:p="http://schemas.openxmlformats.org/presentationml/2006/main">
   <p:cSld>
     <p:spTree>
@@ -4443,10 +4774,10 @@
       </p:grpSpPr>
       <p:pic>
         <p:nvPicPr>
-          <p:cNvPr id="27" name="Grafik 26">
-            <a:extLst>
-              <a:ext uri="{FF2B5EF4-FFF2-40B4-BE49-F238E27FC236}">
-                <a16:creationId xmlns:a16="http://schemas.microsoft.com/office/drawing/2014/main" id="{546EAC80-D742-594F-ADF7-E07094174DD2}"/>
+          <p:cNvPr id="4" name="Grafik 3">
+            <a:extLst>
+              <a:ext uri="{FF2B5EF4-FFF2-40B4-BE49-F238E27FC236}">
+                <a16:creationId xmlns:a16="http://schemas.microsoft.com/office/drawing/2014/main" id="{8C3F0816-F3B2-B347-87C5-6A63C4D9BBF9}"/>
               </a:ext>
             </a:extLst>
           </p:cNvPr>
@@ -4463,8 +4794,8 @@
         </p:blipFill>
         <p:spPr>
           <a:xfrm>
-            <a:off x="321304" y="0"/>
-            <a:ext cx="11320784" cy="6858000"/>
+            <a:off x="1564446" y="0"/>
+            <a:ext cx="8708252" cy="6858000"/>
           </a:xfrm>
           <a:prstGeom prst="rect">
             <a:avLst/>
@@ -4473,10 +4804,10 @@
       </p:pic>
       <p:grpSp>
         <p:nvGrpSpPr>
-          <p:cNvPr id="9" name="Gruppieren 8">
-            <a:extLst>
-              <a:ext uri="{FF2B5EF4-FFF2-40B4-BE49-F238E27FC236}">
-                <a16:creationId xmlns:a16="http://schemas.microsoft.com/office/drawing/2014/main" id="{F58E8A7F-096E-7243-9C8A-7B46F5E9689E}"/>
+          <p:cNvPr id="6" name="Gruppieren 5">
+            <a:extLst>
+              <a:ext uri="{FF2B5EF4-FFF2-40B4-BE49-F238E27FC236}">
+                <a16:creationId xmlns:a16="http://schemas.microsoft.com/office/drawing/2014/main" id="{239247FF-640E-3740-852A-9C04319F3FD9}"/>
               </a:ext>
             </a:extLst>
           </p:cNvPr>
@@ -4485,7 +4816,7 @@
         </p:nvGrpSpPr>
         <p:grpSpPr>
           <a:xfrm>
-            <a:off x="6472236" y="3066568"/>
+            <a:off x="6996113" y="2667975"/>
             <a:ext cx="3228975" cy="369332"/>
             <a:chOff x="3357563" y="1445180"/>
             <a:chExt cx="3228975" cy="369332"/>
@@ -4496,7 +4827,7 @@
             <p:cNvPr id="7" name="Pfeil nach links 6">
               <a:extLst>
                 <a:ext uri="{FF2B5EF4-FFF2-40B4-BE49-F238E27FC236}">
-                  <a16:creationId xmlns:a16="http://schemas.microsoft.com/office/drawing/2014/main" id="{EF19B7B5-144C-0D4D-8589-845C4315C67C}"/>
+                  <a16:creationId xmlns:a16="http://schemas.microsoft.com/office/drawing/2014/main" id="{27E72905-14FA-F742-B7E3-91C4EC907FA2}"/>
                 </a:ext>
               </a:extLst>
             </p:cNvPr>
@@ -4554,7 +4885,7 @@
             <p:cNvPr id="8" name="Textfeld 7">
               <a:extLst>
                 <a:ext uri="{FF2B5EF4-FFF2-40B4-BE49-F238E27FC236}">
-                  <a16:creationId xmlns:a16="http://schemas.microsoft.com/office/drawing/2014/main" id="{7A067A7D-A7A2-0E44-81A8-7D152F4A152F}"/>
+                  <a16:creationId xmlns:a16="http://schemas.microsoft.com/office/drawing/2014/main" id="{6DCAF3B4-F627-7240-9174-A4F7C0E11242}"/>
                 </a:ext>
               </a:extLst>
             </p:cNvPr>
@@ -4587,10 +4918,10 @@
       </p:grpSp>
       <p:grpSp>
         <p:nvGrpSpPr>
-          <p:cNvPr id="13" name="Gruppieren 12">
-            <a:extLst>
-              <a:ext uri="{FF2B5EF4-FFF2-40B4-BE49-F238E27FC236}">
-                <a16:creationId xmlns:a16="http://schemas.microsoft.com/office/drawing/2014/main" id="{2C3F16F4-77FA-F741-BAE0-641E7F28F427}"/>
+          <p:cNvPr id="9" name="Gruppieren 8">
+            <a:extLst>
+              <a:ext uri="{FF2B5EF4-FFF2-40B4-BE49-F238E27FC236}">
+                <a16:creationId xmlns:a16="http://schemas.microsoft.com/office/drawing/2014/main" id="{0A3362EE-EABC-1744-9926-73339B903D99}"/>
               </a:ext>
             </a:extLst>
           </p:cNvPr>
@@ -4599,7 +4930,7 @@
         </p:nvGrpSpPr>
         <p:grpSpPr>
           <a:xfrm>
-            <a:off x="7181851" y="4190518"/>
+            <a:off x="7167563" y="4246971"/>
             <a:ext cx="3228975" cy="485777"/>
             <a:chOff x="3357563" y="1328735"/>
             <a:chExt cx="3228975" cy="485777"/>
@@ -4607,10 +4938,10 @@
         </p:grpSpPr>
         <p:sp>
           <p:nvSpPr>
-            <p:cNvPr id="14" name="Pfeil nach links 13">
+            <p:cNvPr id="10" name="Pfeil nach links 9">
               <a:extLst>
                 <a:ext uri="{FF2B5EF4-FFF2-40B4-BE49-F238E27FC236}">
-                  <a16:creationId xmlns:a16="http://schemas.microsoft.com/office/drawing/2014/main" id="{692FFBAB-47C5-2248-B39C-FAA0ADA23E33}"/>
+                  <a16:creationId xmlns:a16="http://schemas.microsoft.com/office/drawing/2014/main" id="{DDC45D36-F48D-E84A-8771-C04550BC4D68}"/>
                 </a:ext>
               </a:extLst>
             </p:cNvPr>
@@ -4665,10 +4996,10 @@
         </p:sp>
         <p:sp>
           <p:nvSpPr>
-            <p:cNvPr id="15" name="Textfeld 14">
+            <p:cNvPr id="11" name="Textfeld 10">
               <a:extLst>
                 <a:ext uri="{FF2B5EF4-FFF2-40B4-BE49-F238E27FC236}">
-                  <a16:creationId xmlns:a16="http://schemas.microsoft.com/office/drawing/2014/main" id="{DD09E91B-2538-764D-9BBE-8B67C0BEF5D1}"/>
+                  <a16:creationId xmlns:a16="http://schemas.microsoft.com/office/drawing/2014/main" id="{AD72C62D-0C61-C242-8C4F-F1298A6E560D}"/>
                 </a:ext>
               </a:extLst>
             </p:cNvPr>
@@ -4702,7 +5033,7 @@
     </p:spTree>
     <p:extLst>
       <p:ext uri="{BB962C8B-B14F-4D97-AF65-F5344CB8AC3E}">
-        <p14:creationId xmlns:p14="http://schemas.microsoft.com/office/powerpoint/2010/main" val="658215297"/>
+        <p14:creationId xmlns:p14="http://schemas.microsoft.com/office/powerpoint/2010/main" val="4193772513"/>
       </p:ext>
     </p:extLst>
   </p:cSld>
@@ -4712,7 +5043,7 @@
 </p:sld>
 </file>
 
-<file path=ppt/slides/slide4.xml><?xml version="1.0" encoding="utf-8"?>
+<file path=ppt/slides/slide5.xml><?xml version="1.0" encoding="utf-8"?>
 <p:sld xmlns:a="http://schemas.openxmlformats.org/drawingml/2006/main" xmlns:r="http://schemas.openxmlformats.org/officeDocument/2006/relationships" xmlns:p="http://schemas.openxmlformats.org/presentationml/2006/main">
   <p:cSld>
     <p:spTree>
@@ -4731,10 +5062,10 @@
       </p:grpSpPr>
       <p:pic>
         <p:nvPicPr>
-          <p:cNvPr id="27" name="Grafik 26">
-            <a:extLst>
-              <a:ext uri="{FF2B5EF4-FFF2-40B4-BE49-F238E27FC236}">
-                <a16:creationId xmlns:a16="http://schemas.microsoft.com/office/drawing/2014/main" id="{546EAC80-D742-594F-ADF7-E07094174DD2}"/>
+          <p:cNvPr id="4" name="Grafik 3">
+            <a:extLst>
+              <a:ext uri="{FF2B5EF4-FFF2-40B4-BE49-F238E27FC236}">
+                <a16:creationId xmlns:a16="http://schemas.microsoft.com/office/drawing/2014/main" id="{8C3F0816-F3B2-B347-87C5-6A63C4D9BBF9}"/>
               </a:ext>
             </a:extLst>
           </p:cNvPr>
@@ -4751,8 +5082,8 @@
         </p:blipFill>
         <p:spPr>
           <a:xfrm>
-            <a:off x="321304" y="0"/>
-            <a:ext cx="11320784" cy="6858000"/>
+            <a:off x="1564446" y="0"/>
+            <a:ext cx="8708252" cy="6858000"/>
           </a:xfrm>
           <a:prstGeom prst="rect">
             <a:avLst/>
@@ -4761,10 +5092,10 @@
       </p:pic>
       <p:grpSp>
         <p:nvGrpSpPr>
-          <p:cNvPr id="16" name="Gruppieren 15">
-            <a:extLst>
-              <a:ext uri="{FF2B5EF4-FFF2-40B4-BE49-F238E27FC236}">
-                <a16:creationId xmlns:a16="http://schemas.microsoft.com/office/drawing/2014/main" id="{E28368B3-8336-F144-BFFC-09198A87F5A4}"/>
+          <p:cNvPr id="6" name="Gruppieren 5">
+            <a:extLst>
+              <a:ext uri="{FF2B5EF4-FFF2-40B4-BE49-F238E27FC236}">
+                <a16:creationId xmlns:a16="http://schemas.microsoft.com/office/drawing/2014/main" id="{2F79208A-D983-2648-AE24-60682748BECB}"/>
               </a:ext>
             </a:extLst>
           </p:cNvPr>
@@ -4773,7 +5104,7 @@
         </p:nvGrpSpPr>
         <p:grpSpPr>
           <a:xfrm>
-            <a:off x="3709980" y="4564915"/>
+            <a:off x="4667250" y="4822096"/>
             <a:ext cx="3228975" cy="369332"/>
             <a:chOff x="3357563" y="1430892"/>
             <a:chExt cx="3228975" cy="369332"/>
@@ -4781,10 +5112,10 @@
         </p:grpSpPr>
         <p:sp>
           <p:nvSpPr>
-            <p:cNvPr id="17" name="Pfeil nach links 16">
+            <p:cNvPr id="7" name="Pfeil nach links 6">
               <a:extLst>
                 <a:ext uri="{FF2B5EF4-FFF2-40B4-BE49-F238E27FC236}">
-                  <a16:creationId xmlns:a16="http://schemas.microsoft.com/office/drawing/2014/main" id="{0A9E8808-CCDE-664F-8E2A-71B9F3604E5B}"/>
+                  <a16:creationId xmlns:a16="http://schemas.microsoft.com/office/drawing/2014/main" id="{EBCD3B56-57AA-4545-B885-AAD35FEDC3AD}"/>
                 </a:ext>
               </a:extLst>
             </p:cNvPr>
@@ -4839,10 +5170,10 @@
         </p:sp>
         <p:sp>
           <p:nvSpPr>
-            <p:cNvPr id="18" name="Textfeld 17">
+            <p:cNvPr id="8" name="Textfeld 7">
               <a:extLst>
                 <a:ext uri="{FF2B5EF4-FFF2-40B4-BE49-F238E27FC236}">
-                  <a16:creationId xmlns:a16="http://schemas.microsoft.com/office/drawing/2014/main" id="{166F128E-377F-DE4F-BD39-77C63F9F120E}"/>
+                  <a16:creationId xmlns:a16="http://schemas.microsoft.com/office/drawing/2014/main" id="{B54008EC-F7F1-554A-A099-820E7BBDCE41}"/>
                 </a:ext>
               </a:extLst>
             </p:cNvPr>
@@ -4875,10 +5206,10 @@
       </p:grpSp>
       <p:sp>
         <p:nvSpPr>
-          <p:cNvPr id="19" name="Abgerundetes Rechteck 18">
-            <a:extLst>
-              <a:ext uri="{FF2B5EF4-FFF2-40B4-BE49-F238E27FC236}">
-                <a16:creationId xmlns:a16="http://schemas.microsoft.com/office/drawing/2014/main" id="{BC9198E3-DE46-554A-BFFA-D928C56AB1C4}"/>
+          <p:cNvPr id="9" name="Abgerundetes Rechteck 8">
+            <a:extLst>
+              <a:ext uri="{FF2B5EF4-FFF2-40B4-BE49-F238E27FC236}">
+                <a16:creationId xmlns:a16="http://schemas.microsoft.com/office/drawing/2014/main" id="{41B5A8A1-30E6-8149-94E4-4889AE7CC667}"/>
               </a:ext>
             </a:extLst>
           </p:cNvPr>
@@ -4887,7 +5218,7 @@
         </p:nvSpPr>
         <p:spPr>
           <a:xfrm>
-            <a:off x="10671263" y="4541399"/>
+            <a:off x="9481354" y="4625672"/>
             <a:ext cx="767539" cy="392848"/>
           </a:xfrm>
           <a:prstGeom prst="roundRect">
@@ -4923,10 +5254,10 @@
       </p:sp>
       <p:sp>
         <p:nvSpPr>
-          <p:cNvPr id="28" name="Abgerundetes Rechteck 27">
-            <a:extLst>
-              <a:ext uri="{FF2B5EF4-FFF2-40B4-BE49-F238E27FC236}">
-                <a16:creationId xmlns:a16="http://schemas.microsoft.com/office/drawing/2014/main" id="{D0D6E76A-EA7E-8642-9A65-49BD2F3BC55E}"/>
+          <p:cNvPr id="10" name="Abgerundetes Rechteck 9">
+            <a:extLst>
+              <a:ext uri="{FF2B5EF4-FFF2-40B4-BE49-F238E27FC236}">
+                <a16:creationId xmlns:a16="http://schemas.microsoft.com/office/drawing/2014/main" id="{6057FCB3-14FD-CF4E-92D0-BE0B03A5969D}"/>
               </a:ext>
             </a:extLst>
           </p:cNvPr>
@@ -4935,7 +5266,7 @@
         </p:nvSpPr>
         <p:spPr>
           <a:xfrm>
-            <a:off x="9903724" y="235406"/>
+            <a:off x="8735800" y="192543"/>
             <a:ext cx="767539" cy="392848"/>
           </a:xfrm>
           <a:prstGeom prst="roundRect">
@@ -4972,7 +5303,7 @@
     </p:spTree>
     <p:extLst>
       <p:ext uri="{BB962C8B-B14F-4D97-AF65-F5344CB8AC3E}">
-        <p14:creationId xmlns:p14="http://schemas.microsoft.com/office/powerpoint/2010/main" val="1744567007"/>
+        <p14:creationId xmlns:p14="http://schemas.microsoft.com/office/powerpoint/2010/main" val="1004092349"/>
       </p:ext>
     </p:extLst>
   </p:cSld>
@@ -4982,7 +5313,7 @@
 </p:sld>
 </file>
 
-<file path=ppt/slides/slide5.xml><?xml version="1.0" encoding="utf-8"?>
+<file path=ppt/slides/slide6.xml><?xml version="1.0" encoding="utf-8"?>
 <p:sld xmlns:a="http://schemas.openxmlformats.org/drawingml/2006/main" xmlns:r="http://schemas.openxmlformats.org/officeDocument/2006/relationships" xmlns:p="http://schemas.openxmlformats.org/presentationml/2006/main">
   <p:cSld>
     <p:spTree>
@@ -5001,10 +5332,10 @@
       </p:grpSpPr>
       <p:pic>
         <p:nvPicPr>
-          <p:cNvPr id="27" name="Grafik 26">
-            <a:extLst>
-              <a:ext uri="{FF2B5EF4-FFF2-40B4-BE49-F238E27FC236}">
-                <a16:creationId xmlns:a16="http://schemas.microsoft.com/office/drawing/2014/main" id="{546EAC80-D742-594F-ADF7-E07094174DD2}"/>
+          <p:cNvPr id="4" name="Grafik 3">
+            <a:extLst>
+              <a:ext uri="{FF2B5EF4-FFF2-40B4-BE49-F238E27FC236}">
+                <a16:creationId xmlns:a16="http://schemas.microsoft.com/office/drawing/2014/main" id="{8C3F0816-F3B2-B347-87C5-6A63C4D9BBF9}"/>
               </a:ext>
             </a:extLst>
           </p:cNvPr>
@@ -5021,8 +5352,8 @@
         </p:blipFill>
         <p:spPr>
           <a:xfrm>
-            <a:off x="321304" y="0"/>
-            <a:ext cx="11320784" cy="6858000"/>
+            <a:off x="1564446" y="0"/>
+            <a:ext cx="8708252" cy="6858000"/>
           </a:xfrm>
           <a:prstGeom prst="rect">
             <a:avLst/>
@@ -5031,10 +5362,10 @@
       </p:pic>
       <p:sp>
         <p:nvSpPr>
-          <p:cNvPr id="28" name="Abgerundetes Rechteck 27">
-            <a:extLst>
-              <a:ext uri="{FF2B5EF4-FFF2-40B4-BE49-F238E27FC236}">
-                <a16:creationId xmlns:a16="http://schemas.microsoft.com/office/drawing/2014/main" id="{D0D6E76A-EA7E-8642-9A65-49BD2F3BC55E}"/>
+          <p:cNvPr id="11" name="Abgerundetes Rechteck 10">
+            <a:extLst>
+              <a:ext uri="{FF2B5EF4-FFF2-40B4-BE49-F238E27FC236}">
+                <a16:creationId xmlns:a16="http://schemas.microsoft.com/office/drawing/2014/main" id="{127F5B99-8A7C-B740-B114-FDEA92741F9D}"/>
               </a:ext>
             </a:extLst>
           </p:cNvPr>
@@ -5043,7 +5374,7 @@
         </p:nvSpPr>
         <p:spPr>
           <a:xfrm>
-            <a:off x="2208301" y="221119"/>
+            <a:off x="3251292" y="192543"/>
             <a:ext cx="767539" cy="392848"/>
           </a:xfrm>
           <a:prstGeom prst="roundRect">
@@ -5079,10 +5410,10 @@
       </p:sp>
       <p:grpSp>
         <p:nvGrpSpPr>
-          <p:cNvPr id="20" name="Gruppieren 19">
-            <a:extLst>
-              <a:ext uri="{FF2B5EF4-FFF2-40B4-BE49-F238E27FC236}">
-                <a16:creationId xmlns:a16="http://schemas.microsoft.com/office/drawing/2014/main" id="{95B61E77-FA8F-4343-82B3-211154E13D30}"/>
+          <p:cNvPr id="12" name="Gruppieren 11">
+            <a:extLst>
+              <a:ext uri="{FF2B5EF4-FFF2-40B4-BE49-F238E27FC236}">
+                <a16:creationId xmlns:a16="http://schemas.microsoft.com/office/drawing/2014/main" id="{7F8C5A27-41DB-D348-8548-0975387AEBDD}"/>
               </a:ext>
             </a:extLst>
           </p:cNvPr>
@@ -5091,7 +5422,7 @@
         </p:nvGrpSpPr>
         <p:grpSpPr>
           <a:xfrm>
-            <a:off x="2838452" y="376236"/>
+            <a:off x="3881443" y="376236"/>
             <a:ext cx="3900486" cy="528642"/>
             <a:chOff x="3443290" y="1371598"/>
             <a:chExt cx="3900486" cy="528642"/>
@@ -5099,10 +5430,10 @@
         </p:grpSpPr>
         <p:sp>
           <p:nvSpPr>
-            <p:cNvPr id="21" name="Pfeil nach links 20">
+            <p:cNvPr id="13" name="Pfeil nach links 12">
               <a:extLst>
                 <a:ext uri="{FF2B5EF4-FFF2-40B4-BE49-F238E27FC236}">
-                  <a16:creationId xmlns:a16="http://schemas.microsoft.com/office/drawing/2014/main" id="{291B682F-8459-7F45-9D4B-0EB2D7D0DC8D}"/>
+                  <a16:creationId xmlns:a16="http://schemas.microsoft.com/office/drawing/2014/main" id="{69A07AF9-3561-614A-8065-40ED8FD6CDE5}"/>
                 </a:ext>
               </a:extLst>
             </p:cNvPr>
@@ -5157,10 +5488,10 @@
         </p:sp>
         <p:sp>
           <p:nvSpPr>
-            <p:cNvPr id="22" name="Textfeld 21">
+            <p:cNvPr id="14" name="Textfeld 13">
               <a:extLst>
                 <a:ext uri="{FF2B5EF4-FFF2-40B4-BE49-F238E27FC236}">
-                  <a16:creationId xmlns:a16="http://schemas.microsoft.com/office/drawing/2014/main" id="{C82C4EDF-0857-6B4B-9BCD-69B3E8662383}"/>
+                  <a16:creationId xmlns:a16="http://schemas.microsoft.com/office/drawing/2014/main" id="{81A75298-0C87-954E-A0C8-1E6C4559DBC7}"/>
                 </a:ext>
               </a:extLst>
             </p:cNvPr>
@@ -5194,7 +5525,7 @@
     </p:spTree>
     <p:extLst>
       <p:ext uri="{BB962C8B-B14F-4D97-AF65-F5344CB8AC3E}">
-        <p14:creationId xmlns:p14="http://schemas.microsoft.com/office/powerpoint/2010/main" val="1761991430"/>
+        <p14:creationId xmlns:p14="http://schemas.microsoft.com/office/powerpoint/2010/main" val="910441776"/>
       </p:ext>
     </p:extLst>
   </p:cSld>
@@ -5204,7 +5535,7 @@
 </p:sld>
 </file>
 
-<file path=ppt/slides/slide6.xml><?xml version="1.0" encoding="utf-8"?>
+<file path=ppt/slides/slide7.xml><?xml version="1.0" encoding="utf-8"?>
 <p:sld xmlns:a="http://schemas.openxmlformats.org/drawingml/2006/main" xmlns:r="http://schemas.openxmlformats.org/officeDocument/2006/relationships" xmlns:p="http://schemas.openxmlformats.org/presentationml/2006/main">
   <p:cSld>
     <p:spTree>
@@ -5264,7 +5595,7 @@
 </p:sld>
 </file>
 
-<file path=ppt/slides/slide7.xml><?xml version="1.0" encoding="utf-8"?>
+<file path=ppt/slides/slide8.xml><?xml version="1.0" encoding="utf-8"?>
 <p:sld xmlns:a="http://schemas.openxmlformats.org/drawingml/2006/main" xmlns:r="http://schemas.openxmlformats.org/officeDocument/2006/relationships" xmlns:p="http://schemas.openxmlformats.org/presentationml/2006/main">
   <p:cSld>
     <p:spTree>
@@ -5682,7 +6013,7 @@
 </p:sld>
 </file>
 
-<file path=ppt/slides/slide8.xml><?xml version="1.0" encoding="utf-8"?>
+<file path=ppt/slides/slide9.xml><?xml version="1.0" encoding="utf-8"?>
 <p:sld xmlns:a="http://schemas.openxmlformats.org/drawingml/2006/main" xmlns:r="http://schemas.openxmlformats.org/officeDocument/2006/relationships" xmlns:p="http://schemas.openxmlformats.org/presentationml/2006/main">
   <p:cSld>
     <p:spTree>
@@ -5987,228 +6318,6 @@
     <p:extLst>
       <p:ext uri="{BB962C8B-B14F-4D97-AF65-F5344CB8AC3E}">
         <p14:creationId xmlns:p14="http://schemas.microsoft.com/office/powerpoint/2010/main" val="1558645564"/>
-      </p:ext>
-    </p:extLst>
-  </p:cSld>
-  <p:clrMapOvr>
-    <a:masterClrMapping/>
-  </p:clrMapOvr>
-</p:sld>
-</file>
-
-<file path=ppt/slides/slide9.xml><?xml version="1.0" encoding="utf-8"?>
-<p:sld xmlns:a="http://schemas.openxmlformats.org/drawingml/2006/main" xmlns:r="http://schemas.openxmlformats.org/officeDocument/2006/relationships" xmlns:p="http://schemas.openxmlformats.org/presentationml/2006/main">
-  <p:cSld>
-    <p:spTree>
-      <p:nvGrpSpPr>
-        <p:cNvPr id="1" name=""/>
-        <p:cNvGrpSpPr/>
-        <p:nvPr/>
-      </p:nvGrpSpPr>
-      <p:grpSpPr>
-        <a:xfrm>
-          <a:off x="0" y="0"/>
-          <a:ext cx="0" cy="0"/>
-          <a:chOff x="0" y="0"/>
-          <a:chExt cx="0" cy="0"/>
-        </a:xfrm>
-      </p:grpSpPr>
-      <p:pic>
-        <p:nvPicPr>
-          <p:cNvPr id="2" name="Grafik 1">
-            <a:extLst>
-              <a:ext uri="{FF2B5EF4-FFF2-40B4-BE49-F238E27FC236}">
-                <a16:creationId xmlns:a16="http://schemas.microsoft.com/office/drawing/2014/main" id="{ABBB131D-E791-5B45-9628-14A2F970BCCC}"/>
-              </a:ext>
-            </a:extLst>
-          </p:cNvPr>
-          <p:cNvPicPr>
-            <a:picLocks noChangeAspect="1"/>
-          </p:cNvPicPr>
-          <p:nvPr/>
-        </p:nvPicPr>
-        <p:blipFill>
-          <a:blip r:embed="rId2"/>
-          <a:stretch>
-            <a:fillRect/>
-          </a:stretch>
-        </p:blipFill>
-        <p:spPr>
-          <a:xfrm>
-            <a:off x="237722" y="0"/>
-            <a:ext cx="11716555" cy="6858000"/>
-          </a:xfrm>
-          <a:prstGeom prst="rect">
-            <a:avLst/>
-          </a:prstGeom>
-        </p:spPr>
-      </p:pic>
-      <p:sp>
-        <p:nvSpPr>
-          <p:cNvPr id="3" name="Abgerundetes Rechteck 2">
-            <a:extLst>
-              <a:ext uri="{FF2B5EF4-FFF2-40B4-BE49-F238E27FC236}">
-                <a16:creationId xmlns:a16="http://schemas.microsoft.com/office/drawing/2014/main" id="{7047D953-CDB4-C347-AA79-FDE6382F9862}"/>
-              </a:ext>
-            </a:extLst>
-          </p:cNvPr>
-          <p:cNvSpPr/>
-          <p:nvPr/>
-        </p:nvSpPr>
-        <p:spPr>
-          <a:xfrm>
-            <a:off x="10672353" y="0"/>
-            <a:ext cx="1281924" cy="271463"/>
-          </a:xfrm>
-          <a:prstGeom prst="roundRect">
-            <a:avLst/>
-          </a:prstGeom>
-          <a:noFill/>
-          <a:ln w="38100">
-            <a:solidFill>
-              <a:schemeClr val="accent2">
-                <a:lumMod val="50000"/>
-              </a:schemeClr>
-            </a:solidFill>
-          </a:ln>
-        </p:spPr>
-        <p:style>
-          <a:lnRef idx="2">
-            <a:schemeClr val="accent1">
-              <a:shade val="50000"/>
-            </a:schemeClr>
-          </a:lnRef>
-          <a:fillRef idx="1">
-            <a:schemeClr val="accent1"/>
-          </a:fillRef>
-          <a:effectRef idx="0">
-            <a:schemeClr val="accent1"/>
-          </a:effectRef>
-          <a:fontRef idx="minor">
-            <a:schemeClr val="lt1"/>
-          </a:fontRef>
-        </p:style>
-        <p:txBody>
-          <a:bodyPr rtlCol="0" anchor="ctr"/>
-          <a:lstStyle/>
-          <a:p>
-            <a:pPr algn="ctr"/>
-            <a:endParaRPr lang="de-DE"/>
-          </a:p>
-        </p:txBody>
-      </p:sp>
-      <p:sp>
-        <p:nvSpPr>
-          <p:cNvPr id="4" name="Abgerundetes Rechteck 3">
-            <a:extLst>
-              <a:ext uri="{FF2B5EF4-FFF2-40B4-BE49-F238E27FC236}">
-                <a16:creationId xmlns:a16="http://schemas.microsoft.com/office/drawing/2014/main" id="{8793852D-BF36-0948-848D-B36964E18CB4}"/>
-              </a:ext>
-            </a:extLst>
-          </p:cNvPr>
-          <p:cNvSpPr/>
-          <p:nvPr/>
-        </p:nvSpPr>
-        <p:spPr>
-          <a:xfrm>
-            <a:off x="7867239" y="523875"/>
-            <a:ext cx="4087037" cy="271463"/>
-          </a:xfrm>
-          <a:prstGeom prst="roundRect">
-            <a:avLst/>
-          </a:prstGeom>
-          <a:noFill/>
-          <a:ln w="38100">
-            <a:solidFill>
-              <a:schemeClr val="accent2">
-                <a:lumMod val="50000"/>
-              </a:schemeClr>
-            </a:solidFill>
-          </a:ln>
-        </p:spPr>
-        <p:style>
-          <a:lnRef idx="2">
-            <a:schemeClr val="accent1">
-              <a:shade val="50000"/>
-            </a:schemeClr>
-          </a:lnRef>
-          <a:fillRef idx="1">
-            <a:schemeClr val="accent1"/>
-          </a:fillRef>
-          <a:effectRef idx="0">
-            <a:schemeClr val="accent1"/>
-          </a:effectRef>
-          <a:fontRef idx="minor">
-            <a:schemeClr val="lt1"/>
-          </a:fontRef>
-        </p:style>
-        <p:txBody>
-          <a:bodyPr rtlCol="0" anchor="ctr"/>
-          <a:lstStyle/>
-          <a:p>
-            <a:pPr algn="ctr"/>
-            <a:endParaRPr lang="de-DE"/>
-          </a:p>
-        </p:txBody>
-      </p:sp>
-      <p:sp>
-        <p:nvSpPr>
-          <p:cNvPr id="5" name="Abgerundetes Rechteck 4">
-            <a:extLst>
-              <a:ext uri="{FF2B5EF4-FFF2-40B4-BE49-F238E27FC236}">
-                <a16:creationId xmlns:a16="http://schemas.microsoft.com/office/drawing/2014/main" id="{67BD2F50-D3DF-D447-A339-D5FA73D67B2C}"/>
-              </a:ext>
-            </a:extLst>
-          </p:cNvPr>
-          <p:cNvSpPr/>
-          <p:nvPr/>
-        </p:nvSpPr>
-        <p:spPr>
-          <a:xfrm>
-            <a:off x="3676239" y="0"/>
-            <a:ext cx="438561" cy="271463"/>
-          </a:xfrm>
-          <a:prstGeom prst="roundRect">
-            <a:avLst/>
-          </a:prstGeom>
-          <a:noFill/>
-          <a:ln w="38100">
-            <a:solidFill>
-              <a:schemeClr val="accent2">
-                <a:lumMod val="50000"/>
-              </a:schemeClr>
-            </a:solidFill>
-          </a:ln>
-        </p:spPr>
-        <p:style>
-          <a:lnRef idx="2">
-            <a:schemeClr val="accent1">
-              <a:shade val="50000"/>
-            </a:schemeClr>
-          </a:lnRef>
-          <a:fillRef idx="1">
-            <a:schemeClr val="accent1"/>
-          </a:fillRef>
-          <a:effectRef idx="0">
-            <a:schemeClr val="accent1"/>
-          </a:effectRef>
-          <a:fontRef idx="minor">
-            <a:schemeClr val="lt1"/>
-          </a:fontRef>
-        </p:style>
-        <p:txBody>
-          <a:bodyPr rtlCol="0" anchor="ctr"/>
-          <a:lstStyle/>
-          <a:p>
-            <a:pPr algn="ctr"/>
-            <a:endParaRPr lang="de-DE"/>
-          </a:p>
-        </p:txBody>
-      </p:sp>
-    </p:spTree>
-    <p:extLst>
-      <p:ext uri="{BB962C8B-B14F-4D97-AF65-F5344CB8AC3E}">
-        <p14:creationId xmlns:p14="http://schemas.microsoft.com/office/powerpoint/2010/main" val="2350966591"/>
       </p:ext>
     </p:extLst>
   </p:cSld>

</xml_diff>